<commit_message>
rev_1, edit 4, 9 slide
</commit_message>
<xml_diff>
--- a/프로젝트 제안서.pptx
+++ b/프로젝트 제안서.pptx
@@ -20,8 +20,8 @@
     <p:sldId id="286" r:id="rId11"/>
     <p:sldId id="287" r:id="rId12"/>
     <p:sldId id="288" r:id="rId13"/>
-    <p:sldId id="276" r:id="rId14"/>
-    <p:sldId id="289" r:id="rId15"/>
+    <p:sldId id="290" r:id="rId14"/>
+    <p:sldId id="291" r:id="rId15"/>
     <p:sldId id="278" r:id="rId16"/>
     <p:sldId id="277" r:id="rId17"/>
     <p:sldId id="279" r:id="rId18"/>
@@ -9783,7 +9783,7 @@
     <mc:Choice Requires="p14">
       <p:transition/>
     </mc:Choice>
-    <mc:Fallback xmlns:dsp="http://schemas.microsoft.com/office/drawing/2008/diagram" xmlns:dgm="http://schemas.openxmlformats.org/drawingml/2006/diagram" xmlns:c="http://schemas.openxmlformats.org/drawingml/2006/chart" xmlns="">
+    <mc:Fallback xmlns="" xmlns:c="http://schemas.openxmlformats.org/drawingml/2006/chart" xmlns:dgm="http://schemas.openxmlformats.org/drawingml/2006/diagram" xmlns:dsp="http://schemas.microsoft.com/office/drawing/2008/diagram">
       <p:transition/>
     </mc:Fallback>
   </mc:AlternateContent>
@@ -10528,7 +10528,7 @@
     <mc:Choice Requires="p14">
       <p:transition/>
     </mc:Choice>
-    <mc:Fallback xmlns:dsp="http://schemas.microsoft.com/office/drawing/2008/diagram" xmlns:dgm="http://schemas.openxmlformats.org/drawingml/2006/diagram" xmlns:c="http://schemas.openxmlformats.org/drawingml/2006/chart" xmlns="">
+    <mc:Fallback xmlns="" xmlns:c="http://schemas.openxmlformats.org/drawingml/2006/chart" xmlns:dgm="http://schemas.openxmlformats.org/drawingml/2006/diagram" xmlns:dsp="http://schemas.microsoft.com/office/drawing/2008/diagram">
       <p:transition/>
     </mc:Fallback>
   </mc:AlternateContent>
@@ -11323,7 +11323,7 @@
     <mc:Choice Requires="p14">
       <p:transition/>
     </mc:Choice>
-    <mc:Fallback xmlns:dsp="http://schemas.microsoft.com/office/drawing/2008/diagram" xmlns:dgm="http://schemas.openxmlformats.org/drawingml/2006/diagram" xmlns:c="http://schemas.openxmlformats.org/drawingml/2006/chart" xmlns="">
+    <mc:Fallback xmlns="" xmlns:c="http://schemas.openxmlformats.org/drawingml/2006/chart" xmlns:dgm="http://schemas.openxmlformats.org/drawingml/2006/diagram" xmlns:dsp="http://schemas.microsoft.com/office/drawing/2008/diagram">
       <p:transition/>
     </mc:Fallback>
   </mc:AlternateContent>
@@ -12428,7 +12428,7 @@
     </p:spTree>
     <p:extLst>
       <p:ext uri="{BB962C8B-B14F-4D97-AF65-F5344CB8AC3E}">
-        <p14:creationId xmlns:p14="http://schemas.microsoft.com/office/powerpoint/2010/main" val="1338557587"/>
+        <p14:creationId xmlns:p14="http://schemas.microsoft.com/office/powerpoint/2010/main" val="355183875"/>
       </p:ext>
     </p:extLst>
   </p:cSld>
@@ -13241,7 +13241,7 @@
     </p:spTree>
     <p:extLst>
       <p:ext uri="{BB962C8B-B14F-4D97-AF65-F5344CB8AC3E}">
-        <p14:creationId xmlns:p14="http://schemas.microsoft.com/office/powerpoint/2010/main" val="3463518484"/>
+        <p14:creationId xmlns:p14="http://schemas.microsoft.com/office/powerpoint/2010/main" val="216295584"/>
       </p:ext>
     </p:extLst>
   </p:cSld>
@@ -14514,7 +14514,7 @@
     <mc:Choice Requires="p14">
       <p:transition/>
     </mc:Choice>
-    <mc:Fallback xmlns="" xmlns:c="http://schemas.openxmlformats.org/drawingml/2006/chart" xmlns:dgm="http://schemas.openxmlformats.org/drawingml/2006/diagram" xmlns:dsp="http://schemas.microsoft.com/office/drawing/2008/diagram">
+    <mc:Fallback xmlns:dsp="http://schemas.microsoft.com/office/drawing/2008/diagram" xmlns:dgm="http://schemas.openxmlformats.org/drawingml/2006/diagram" xmlns:c="http://schemas.openxmlformats.org/drawingml/2006/chart" xmlns="">
       <p:transition/>
     </mc:Fallback>
   </mc:AlternateContent>
@@ -16538,7 +16538,7 @@
     <mc:Choice Requires="p14">
       <p:transition/>
     </mc:Choice>
-    <mc:Fallback xmlns="" xmlns:c="http://schemas.openxmlformats.org/drawingml/2006/chart" xmlns:dgm="http://schemas.openxmlformats.org/drawingml/2006/diagram" xmlns:dsp="http://schemas.microsoft.com/office/drawing/2008/diagram">
+    <mc:Fallback xmlns:dsp="http://schemas.microsoft.com/office/drawing/2008/diagram" xmlns:dgm="http://schemas.openxmlformats.org/drawingml/2006/diagram" xmlns:c="http://schemas.openxmlformats.org/drawingml/2006/chart" xmlns="">
       <p:transition/>
     </mc:Fallback>
   </mc:AlternateContent>
@@ -18744,7 +18744,7 @@
     <mc:Choice Requires="p14">
       <p:transition/>
     </mc:Choice>
-    <mc:Fallback xmlns="" xmlns:c="http://schemas.openxmlformats.org/drawingml/2006/chart" xmlns:dgm="http://schemas.openxmlformats.org/drawingml/2006/diagram" xmlns:dsp="http://schemas.microsoft.com/office/drawing/2008/diagram">
+    <mc:Fallback xmlns:dsp="http://schemas.microsoft.com/office/drawing/2008/diagram" xmlns:dgm="http://schemas.openxmlformats.org/drawingml/2006/diagram" xmlns:c="http://schemas.openxmlformats.org/drawingml/2006/chart" xmlns="">
       <p:transition/>
     </mc:Fallback>
   </mc:AlternateContent>
@@ -26002,8 +26002,8 @@
         </p:nvSpPr>
         <p:spPr>
           <a:xfrm>
-            <a:off x="3666972" y="2039820"/>
-            <a:ext cx="6983785" cy="4401205"/>
+            <a:off x="4101132" y="2356608"/>
+            <a:ext cx="6983785" cy="3785652"/>
           </a:xfrm>
           <a:prstGeom prst="rect">
             <a:avLst/>
@@ -26076,15 +26076,12 @@
                 <a:latin typeface="에스코어 드림 5 Medium" panose="020B0503030302020204" pitchFamily="34" charset="-127"/>
                 <a:ea typeface="에스코어 드림 5 Medium" panose="020B0503030302020204" pitchFamily="34" charset="-127"/>
               </a:rPr>
-              <a:t>대화를 통한 서비스 이용으로 요리 중인 상황에도 손을 쓰지 않고 음식점 서비스 제공에 도움이 될 것</a:t>
-            </a:r>
-            <a:r>
-              <a:rPr lang="en-US" altLang="ko-KR" sz="2000" dirty="0">
-                <a:latin typeface="에스코어 드림 5 Medium" panose="020B0503030302020204" pitchFamily="34" charset="-127"/>
-                <a:ea typeface="에스코어 드림 5 Medium" panose="020B0503030302020204" pitchFamily="34" charset="-127"/>
-              </a:rPr>
-              <a:t>.</a:t>
-            </a:r>
+              <a:t>대화를 통한 서비스 이용으로 요리 중인 상황에도 손을 쓰지 않고 음식점 서비스를 제공</a:t>
+            </a:r>
+            <a:endParaRPr lang="en-US" altLang="ko-KR" sz="2000" dirty="0">
+              <a:latin typeface="에스코어 드림 5 Medium" panose="020B0503030302020204" pitchFamily="34" charset="-127"/>
+              <a:ea typeface="에스코어 드림 5 Medium" panose="020B0503030302020204" pitchFamily="34" charset="-127"/>
+            </a:endParaRPr>
           </a:p>
           <a:p>
             <a:pPr marL="342900" indent="-342900">
@@ -26182,33 +26179,6 @@
                 <a:ea typeface="에스코어 드림 5 Medium" panose="020B0503030302020204" pitchFamily="34" charset="-127"/>
               </a:rPr>
               <a:t>기능 </a:t>
-            </a:r>
-            <a:endParaRPr lang="en-US" altLang="ko-KR" sz="2000" dirty="0">
-              <a:latin typeface="에스코어 드림 5 Medium" panose="020B0503030302020204" pitchFamily="34" charset="-127"/>
-              <a:ea typeface="에스코어 드림 5 Medium" panose="020B0503030302020204" pitchFamily="34" charset="-127"/>
-            </a:endParaRPr>
-          </a:p>
-          <a:p>
-            <a:pPr marL="342900" indent="-342900">
-              <a:buFont typeface="Arial" panose="020B0604020202020204" pitchFamily="34" charset="0"/>
-              <a:buChar char="•"/>
-            </a:pPr>
-            <a:endParaRPr lang="en-US" altLang="ko-KR" sz="2000" dirty="0">
-              <a:latin typeface="에스코어 드림 5 Medium" panose="020B0503030302020204" pitchFamily="34" charset="-127"/>
-              <a:ea typeface="에스코어 드림 5 Medium" panose="020B0503030302020204" pitchFamily="34" charset="-127"/>
-            </a:endParaRPr>
-          </a:p>
-          <a:p>
-            <a:pPr marL="342900" indent="-342900">
-              <a:buFont typeface="Arial" panose="020B0604020202020204" pitchFamily="34" charset="0"/>
-              <a:buChar char="•"/>
-            </a:pPr>
-            <a:r>
-              <a:rPr lang="ko-KR" altLang="en-US" sz="2000" dirty="0">
-                <a:latin typeface="에스코어 드림 5 Medium" panose="020B0503030302020204" pitchFamily="34" charset="-127"/>
-                <a:ea typeface="에스코어 드림 5 Medium" panose="020B0503030302020204" pitchFamily="34" charset="-127"/>
-              </a:rPr>
-              <a:t>예상 혼잡도 안내 기능</a:t>
             </a:r>
             <a:endParaRPr lang="en-US" altLang="ko-KR" sz="2000" dirty="0">
               <a:latin typeface="에스코어 드림 5 Medium" panose="020B0503030302020204" pitchFamily="34" charset="-127"/>
@@ -26737,7 +26707,7 @@
     <mc:Choice Requires="p14">
       <p:transition/>
     </mc:Choice>
-    <mc:Fallback xmlns:dsp="http://schemas.microsoft.com/office/drawing/2008/diagram" xmlns:dgm="http://schemas.openxmlformats.org/drawingml/2006/diagram" xmlns:c="http://schemas.openxmlformats.org/drawingml/2006/chart" xmlns="">
+    <mc:Fallback xmlns="" xmlns:c="http://schemas.openxmlformats.org/drawingml/2006/chart" xmlns:dgm="http://schemas.openxmlformats.org/drawingml/2006/diagram" xmlns:dsp="http://schemas.microsoft.com/office/drawing/2008/diagram">
       <p:transition/>
     </mc:Fallback>
   </mc:AlternateContent>
@@ -27348,7 +27318,7 @@
     <mc:Choice Requires="p14">
       <p:transition/>
     </mc:Choice>
-    <mc:Fallback xmlns:dsp="http://schemas.microsoft.com/office/drawing/2008/diagram" xmlns:dgm="http://schemas.openxmlformats.org/drawingml/2006/diagram" xmlns:c="http://schemas.openxmlformats.org/drawingml/2006/chart" xmlns="">
+    <mc:Fallback xmlns="" xmlns:c="http://schemas.openxmlformats.org/drawingml/2006/chart" xmlns:dgm="http://schemas.openxmlformats.org/drawingml/2006/diagram" xmlns:dsp="http://schemas.microsoft.com/office/drawing/2008/diagram">
       <p:transition/>
     </mc:Fallback>
   </mc:AlternateContent>
@@ -28004,7 +27974,7 @@
     <mc:Choice Requires="p14">
       <p:transition/>
     </mc:Choice>
-    <mc:Fallback xmlns:dsp="http://schemas.microsoft.com/office/drawing/2008/diagram" xmlns:dgm="http://schemas.openxmlformats.org/drawingml/2006/diagram" xmlns:c="http://schemas.openxmlformats.org/drawingml/2006/chart" xmlns="">
+    <mc:Fallback xmlns="" xmlns:c="http://schemas.openxmlformats.org/drawingml/2006/chart" xmlns:dgm="http://schemas.openxmlformats.org/drawingml/2006/diagram" xmlns:dsp="http://schemas.microsoft.com/office/drawing/2008/diagram">
       <p:transition/>
     </mc:Fallback>
   </mc:AlternateContent>
@@ -28532,7 +28502,7 @@
     <mc:Choice Requires="p14">
       <p:transition/>
     </mc:Choice>
-    <mc:Fallback xmlns:dsp="http://schemas.microsoft.com/office/drawing/2008/diagram" xmlns:dgm="http://schemas.openxmlformats.org/drawingml/2006/diagram" xmlns:c="http://schemas.openxmlformats.org/drawingml/2006/chart" xmlns="">
+    <mc:Fallback xmlns="" xmlns:c="http://schemas.openxmlformats.org/drawingml/2006/chart" xmlns:dgm="http://schemas.openxmlformats.org/drawingml/2006/diagram" xmlns:dsp="http://schemas.microsoft.com/office/drawing/2008/diagram">
       <p:transition/>
     </mc:Fallback>
   </mc:AlternateContent>
@@ -28990,8 +28960,8 @@
         </p:nvSpPr>
         <p:spPr>
           <a:xfrm>
-            <a:off x="7730971" y="3115684"/>
-            <a:ext cx="4054629" cy="1816266"/>
+            <a:off x="7731591" y="2555091"/>
+            <a:ext cx="4054629" cy="3061479"/>
           </a:xfrm>
           <a:prstGeom prst="rect">
             <a:avLst/>
@@ -29005,94 +28975,124 @@
           <a:lstStyle/>
           <a:p>
             <a:pPr>
+              <a:lnSpc>
+                <a:spcPct val="150000"/>
+              </a:lnSpc>
               <a:defRPr/>
             </a:pPr>
             <a:r>
-              <a:rPr lang="ko-KR" altLang="en-US" sz="1867">
+              <a:rPr lang="ko-KR" altLang="en-US" sz="1867" dirty="0">
                 <a:latin typeface="에스코어 드림 5 Medium"/>
                 <a:ea typeface="에스코어 드림 5 Medium"/>
               </a:rPr>
               <a:t>하나의 주문마다 주문 시간</a:t>
             </a:r>
             <a:r>
-              <a:rPr lang="en-US" altLang="ko-KR" sz="1867">
+              <a:rPr lang="en-US" altLang="ko-KR" sz="1867" dirty="0">
                 <a:latin typeface="에스코어 드림 5 Medium"/>
                 <a:ea typeface="에스코어 드림 5 Medium"/>
               </a:rPr>
               <a:t>,</a:t>
             </a:r>
             <a:r>
-              <a:rPr lang="ko-KR" altLang="en-US" sz="1867">
+              <a:rPr lang="ko-KR" altLang="en-US" sz="1867" dirty="0">
                 <a:latin typeface="에스코어 드림 5 Medium"/>
                 <a:ea typeface="에스코어 드림 5 Medium"/>
               </a:rPr>
-              <a:t> 메뉴 등을 알려주는 종이 주문서가 출력됩니다</a:t>
-            </a:r>
-            <a:r>
-              <a:rPr lang="en-US" altLang="ko-KR" sz="1867">
-                <a:latin typeface="에스코어 드림 5 Medium"/>
-                <a:ea typeface="에스코어 드림 5 Medium"/>
-              </a:rPr>
-              <a:t>.</a:t>
-            </a:r>
-          </a:p>
-          <a:p>
-            <a:pPr>
-              <a:defRPr/>
-            </a:pPr>
-            <a:endParaRPr lang="ko-KR" altLang="en-US" sz="1867">
+              <a:t> 메뉴 등을 알려주는 종이 주문서가 출력</a:t>
+            </a:r>
+            <a:endParaRPr lang="en-US" altLang="ko-KR" sz="1867" dirty="0">
               <a:latin typeface="에스코어 드림 5 Medium"/>
               <a:ea typeface="에스코어 드림 5 Medium"/>
             </a:endParaRPr>
           </a:p>
           <a:p>
             <a:pPr>
+              <a:lnSpc>
+                <a:spcPct val="150000"/>
+              </a:lnSpc>
               <a:defRPr/>
             </a:pPr>
-            <a:r>
-              <a:rPr lang="ko-KR" altLang="en-US" sz="1867">
-                <a:latin typeface="에스코어 드림 5 Medium"/>
-                <a:ea typeface="에스코어 드림 5 Medium"/>
-              </a:rPr>
-              <a:t>요즘 환경에 대한 관심이 높아진 만큼</a:t>
-            </a:r>
-            <a:r>
-              <a:rPr lang="en-US" altLang="ko-KR" sz="1867">
-                <a:latin typeface="에스코어 드림 5 Medium"/>
-                <a:ea typeface="에스코어 드림 5 Medium"/>
-              </a:rPr>
-              <a:t>,</a:t>
-            </a:r>
-            <a:endParaRPr lang="ko-KR" altLang="en-US" sz="1867">
+            <a:endParaRPr lang="en-US" altLang="ko-KR" sz="1867" dirty="0">
               <a:latin typeface="에스코어 드림 5 Medium"/>
               <a:ea typeface="에스코어 드림 5 Medium"/>
             </a:endParaRPr>
           </a:p>
           <a:p>
             <a:pPr>
+              <a:lnSpc>
+                <a:spcPct val="150000"/>
+              </a:lnSpc>
               <a:defRPr/>
             </a:pPr>
-            <a:r>
-              <a:rPr lang="en-US" altLang="ko-KR" sz="1867">
+            <a:endParaRPr lang="en-US" altLang="ko-KR" sz="1867" dirty="0">
+              <a:latin typeface="에스코어 드림 5 Medium"/>
+              <a:ea typeface="에스코어 드림 5 Medium"/>
+            </a:endParaRPr>
+          </a:p>
+          <a:p>
+            <a:pPr>
+              <a:lnSpc>
+                <a:spcPct val="150000"/>
+              </a:lnSpc>
+              <a:defRPr/>
+            </a:pPr>
+            <a:endParaRPr lang="ko-KR" altLang="en-US" sz="1867" dirty="0">
+              <a:latin typeface="에스코어 드림 5 Medium"/>
+              <a:ea typeface="에스코어 드림 5 Medium"/>
+            </a:endParaRPr>
+          </a:p>
+          <a:p>
+            <a:pPr>
+              <a:lnSpc>
+                <a:spcPct val="150000"/>
+              </a:lnSpc>
+              <a:defRPr/>
+            </a:pPr>
+            <a:r>
+              <a:rPr lang="ko-KR" altLang="en-US" sz="1867" dirty="0">
                 <a:latin typeface="에스코어 드림 5 Medium"/>
                 <a:ea typeface="에스코어 드림 5 Medium"/>
               </a:rPr>
-              <a:t>Bixby</a:t>
-            </a:r>
-            <a:r>
-              <a:rPr lang="ko-KR" altLang="en-US" sz="1867">
+              <a:t>요즘 환경에 대한 관심이 높아진 만큼</a:t>
+            </a:r>
+            <a:r>
+              <a:rPr lang="en-US" altLang="ko-KR" sz="1867" dirty="0">
                 <a:latin typeface="에스코어 드림 5 Medium"/>
                 <a:ea typeface="에스코어 드림 5 Medium"/>
               </a:rPr>
-              <a:t>를 사용하여 이러한 종이의 사용을 감소시킬 수 있을 것입니다</a:t>
-            </a:r>
-            <a:r>
-              <a:rPr lang="en-US" altLang="ko-KR" sz="1867">
+              <a:t>,</a:t>
+            </a:r>
+            <a:endParaRPr lang="ko-KR" altLang="en-US" sz="1867" dirty="0">
+              <a:latin typeface="에스코어 드림 5 Medium"/>
+              <a:ea typeface="에스코어 드림 5 Medium"/>
+            </a:endParaRPr>
+          </a:p>
+          <a:p>
+            <a:pPr>
+              <a:lnSpc>
+                <a:spcPct val="150000"/>
+              </a:lnSpc>
+              <a:defRPr/>
+            </a:pPr>
+            <a:r>
+              <a:rPr lang="en-US" altLang="ko-KR" sz="1867" dirty="0">
                 <a:latin typeface="에스코어 드림 5 Medium"/>
                 <a:ea typeface="에스코어 드림 5 Medium"/>
               </a:rPr>
-              <a:t>.</a:t>
-            </a:r>
+              <a:t>Bixby</a:t>
+            </a:r>
+            <a:r>
+              <a:rPr lang="ko-KR" altLang="en-US" sz="1867" dirty="0">
+                <a:latin typeface="에스코어 드림 5 Medium"/>
+                <a:ea typeface="에스코어 드림 5 Medium"/>
+              </a:rPr>
+              <a:t>를 사용하여 종이의 사용을 감소</a:t>
+            </a:r>
+            <a:endParaRPr lang="en-US" altLang="ko-KR" sz="1867" dirty="0">
+              <a:latin typeface="에스코어 드림 5 Medium"/>
+              <a:ea typeface="에스코어 드림 5 Medium"/>
+            </a:endParaRPr>
           </a:p>
         </p:txBody>
       </p:sp>
@@ -29292,7 +29292,12 @@
             <p:ph type="sldNum" sz="quarter" idx="12"/>
           </p:nvPr>
         </p:nvSpPr>
-        <p:spPr/>
+        <p:spPr>
+          <a:xfrm>
+            <a:off x="8598408" y="6279227"/>
+            <a:ext cx="2743200" cy="365125"/>
+          </a:xfrm>
+        </p:spPr>
         <p:txBody>
           <a:bodyPr/>
           <a:lstStyle/>
@@ -29305,6 +29310,45 @@
           </a:p>
         </p:txBody>
       </p:sp>
+      <p:pic>
+        <p:nvPicPr>
+          <p:cNvPr id="5" name="그래픽 4" descr="줄 화살표: 일자형 단색으로 채워진">
+            <a:extLst>
+              <a:ext uri="{FF2B5EF4-FFF2-40B4-BE49-F238E27FC236}">
+                <a16:creationId xmlns:a16="http://schemas.microsoft.com/office/drawing/2014/main" id="{6925A82A-6C86-4545-8A90-1D8C76396C4F}"/>
+              </a:ext>
+            </a:extLst>
+          </p:cNvPr>
+          <p:cNvPicPr>
+            <a:picLocks noChangeAspect="1"/>
+          </p:cNvPicPr>
+          <p:nvPr/>
+        </p:nvPicPr>
+        <p:blipFill>
+          <a:blip r:embed="rId7">
+            <a:extLst>
+              <a:ext uri="{28A0092B-C50C-407E-A947-70E740481C1C}">
+                <a14:useLocalDpi xmlns:a14="http://schemas.microsoft.com/office/drawing/2010/main" val="0"/>
+              </a:ext>
+              <a:ext uri="{96DAC541-7B7A-43D3-8B79-37D633B846F1}">
+                <asvg:svgBlip xmlns:asvg="http://schemas.microsoft.com/office/drawing/2016/SVG/main" r:embed="rId8"/>
+              </a:ext>
+            </a:extLst>
+          </a:blip>
+          <a:stretch>
+            <a:fillRect/>
+          </a:stretch>
+        </p:blipFill>
+        <p:spPr>
+          <a:xfrm rot="16200000">
+            <a:off x="9263161" y="3740067"/>
+            <a:ext cx="793013" cy="793013"/>
+          </a:xfrm>
+          <a:prstGeom prst="rect">
+            <a:avLst/>
+          </a:prstGeom>
+        </p:spPr>
+      </p:pic>
     </p:spTree>
   </p:cSld>
   <p:clrMapOvr>
@@ -29314,7 +29358,7 @@
     <mc:Choice Requires="p14">
       <p:transition/>
     </mc:Choice>
-    <mc:Fallback xmlns:dsp="http://schemas.microsoft.com/office/drawing/2008/diagram" xmlns:dgm="http://schemas.openxmlformats.org/drawingml/2006/diagram" xmlns:c="http://schemas.openxmlformats.org/drawingml/2006/chart" xmlns="">
+    <mc:Fallback xmlns="" xmlns:c="http://schemas.openxmlformats.org/drawingml/2006/chart" xmlns:dgm="http://schemas.openxmlformats.org/drawingml/2006/diagram" xmlns:dsp="http://schemas.microsoft.com/office/drawing/2008/diagram">
       <p:transition/>
     </mc:Fallback>
   </mc:AlternateContent>

</xml_diff>